<commit_message>
add page for test
add page for test
</commit_message>
<xml_diff>
--- a/MyTraining/Individual development/مهارت تصمیم گیری درست.pptx
+++ b/MyTraining/Individual development/مهارت تصمیم گیری درست.pptx
@@ -18,8 +18,9 @@
     <p:sldId id="270" r:id="rId15"/>
     <p:sldId id="272" r:id="rId16"/>
     <p:sldId id="271" r:id="rId17"/>
-    <p:sldId id="265" r:id="rId18"/>
-    <p:sldId id="260" r:id="rId19"/>
+    <p:sldId id="273" r:id="rId18"/>
+    <p:sldId id="265" r:id="rId19"/>
+    <p:sldId id="260" r:id="rId20"/>
   </p:sldIdLst>
   <p:sldSz cx="12192000" cy="6858000"/>
   <p:notesSz cx="6858000" cy="9144000"/>
@@ -3448,7 +3449,7 @@
                 <a16:creationId xmlns:a16="http://schemas.microsoft.com/office/drawing/2014/main" id="{63FED537-3AF1-4C36-9904-77B6A54D27B5}"/>
               </a:ext>
               <a:ext uri="{C183D7F6-B498-43B3-948B-1728B52AA6E4}">
-                <adec:decorative xmlns="" xmlns:adec="http://schemas.microsoft.com/office/drawing/2017/decorative" val="1"/>
+                <adec:decorative xmlns:adec="http://schemas.microsoft.com/office/drawing/2017/decorative" xmlns="" val="1"/>
               </a:ext>
             </a:extLst>
           </p:cNvPr>
@@ -6447,16 +6448,7 @@
                 </a:solidFill>
                 <a:cs typeface="B Nazanin" panose="00000400000000000000" pitchFamily="2" charset="-78"/>
               </a:rPr>
-              <a:t>نوع </a:t>
-            </a:r>
-            <a:r>
-              <a:rPr lang="fa-IR" b="1" dirty="0">
-                <a:solidFill>
-                  <a:srgbClr val="C00000"/>
-                </a:solidFill>
-                <a:cs typeface="B Nazanin" panose="00000400000000000000" pitchFamily="2" charset="-78"/>
-              </a:rPr>
-              <a:t>سوگیری</a:t>
+              <a:t>نوع سوگیری</a:t>
             </a:r>
           </a:p>
         </p:txBody>
@@ -6965,23 +6957,8 @@
                 </a:solidFill>
                 <a:cs typeface="B Nazanin" panose="00000400000000000000" pitchFamily="2" charset="-78"/>
               </a:rPr>
-              <a:t>نوع </a:t>
-            </a:r>
-            <a:r>
-              <a:rPr lang="fa-IR" b="1" dirty="0">
-                <a:solidFill>
-                  <a:srgbClr val="0070C0"/>
-                </a:solidFill>
-                <a:cs typeface="B Nazanin" panose="00000400000000000000" pitchFamily="2" charset="-78"/>
-              </a:rPr>
-              <a:t>تحریف</a:t>
-            </a:r>
-            <a:endParaRPr lang="fa-IR" b="1" dirty="0">
-              <a:solidFill>
-                <a:srgbClr val="0070C0"/>
-              </a:solidFill>
-              <a:cs typeface="B Nazanin" panose="00000400000000000000" pitchFamily="2" charset="-78"/>
-            </a:endParaRPr>
+              <a:t>نوع تحریف</a:t>
+            </a:r>
           </a:p>
         </p:txBody>
       </p:sp>
@@ -8013,6 +7990,114 @@
     </p:spTree>
     <p:extLst>
       <p:ext uri="{BB962C8B-B14F-4D97-AF65-F5344CB8AC3E}">
+        <p14:creationId xmlns:p14="http://schemas.microsoft.com/office/powerpoint/2010/main" val="209127955"/>
+      </p:ext>
+    </p:extLst>
+  </p:cSld>
+  <p:clrMapOvr>
+    <a:masterClrMapping/>
+  </p:clrMapOvr>
+  <p:timing>
+    <p:tnLst>
+      <p:par>
+        <p:cTn id="1" dur="indefinite" restart="never" nodeType="tmRoot"/>
+      </p:par>
+    </p:tnLst>
+  </p:timing>
+</p:sld>
+</file>
+
+<file path=ppt/slides/slide15.xml><?xml version="1.0" encoding="utf-8"?>
+<p:sld xmlns:a="http://schemas.openxmlformats.org/drawingml/2006/main" xmlns:r="http://schemas.openxmlformats.org/officeDocument/2006/relationships" xmlns:p="http://schemas.openxmlformats.org/presentationml/2006/main">
+  <p:cSld>
+    <p:spTree>
+      <p:nvGrpSpPr>
+        <p:cNvPr id="1" name=""/>
+        <p:cNvGrpSpPr/>
+        <p:nvPr/>
+      </p:nvGrpSpPr>
+      <p:grpSpPr>
+        <a:xfrm>
+          <a:off x="0" y="0"/>
+          <a:ext cx="0" cy="0"/>
+          <a:chOff x="0" y="0"/>
+          <a:chExt cx="0" cy="0"/>
+        </a:xfrm>
+      </p:grpSpPr>
+      <p:sp>
+        <p:nvSpPr>
+          <p:cNvPr id="2" name="Title 1">
+            <a:extLst>
+              <a:ext uri="{FF2B5EF4-FFF2-40B4-BE49-F238E27FC236}">
+                <a16:creationId xmlns:a16="http://schemas.microsoft.com/office/drawing/2014/main" id="{BB4B6193-F9F1-4C54-838F-77350B9FC5DC}"/>
+              </a:ext>
+            </a:extLst>
+          </p:cNvPr>
+          <p:cNvSpPr>
+            <a:spLocks noGrp="1"/>
+          </p:cNvSpPr>
+          <p:nvPr>
+            <p:ph type="title"/>
+          </p:nvPr>
+        </p:nvSpPr>
+        <p:spPr>
+          <a:xfrm>
+            <a:off x="1169125" y="425299"/>
+            <a:ext cx="9875520" cy="709749"/>
+          </a:xfrm>
+        </p:spPr>
+        <p:txBody>
+          <a:bodyPr>
+            <a:normAutofit fontScale="90000"/>
+          </a:bodyPr>
+          <a:lstStyle/>
+          <a:p>
+            <a:pPr algn="r"/>
+            <a:r>
+              <a:rPr lang="fa-IR" sz="4800" dirty="0" smtClean="0">
+                <a:cs typeface="B Nazanin" panose="00000400000000000000" pitchFamily="2" charset="-78"/>
+              </a:rPr>
+              <a:t>تصمیم گیری چیست ؟</a:t>
+            </a:r>
+            <a:endParaRPr lang="en-US" sz="4800" dirty="0">
+              <a:cs typeface="B Nazanin" panose="00000400000000000000" pitchFamily="2" charset="-78"/>
+            </a:endParaRPr>
+          </a:p>
+        </p:txBody>
+      </p:sp>
+      <p:cxnSp>
+        <p:nvCxnSpPr>
+          <p:cNvPr id="8" name="Straight Connector 7"/>
+          <p:cNvCxnSpPr/>
+          <p:nvPr/>
+        </p:nvCxnSpPr>
+        <p:spPr>
+          <a:xfrm>
+            <a:off x="888274" y="1240973"/>
+            <a:ext cx="10437223" cy="13063"/>
+          </a:xfrm>
+          <a:prstGeom prst="line">
+            <a:avLst/>
+          </a:prstGeom>
+        </p:spPr>
+        <p:style>
+          <a:lnRef idx="3">
+            <a:schemeClr val="accent1"/>
+          </a:lnRef>
+          <a:fillRef idx="0">
+            <a:schemeClr val="accent1"/>
+          </a:fillRef>
+          <a:effectRef idx="2">
+            <a:schemeClr val="accent1"/>
+          </a:effectRef>
+          <a:fontRef idx="minor">
+            <a:schemeClr val="tx1"/>
+          </a:fontRef>
+        </p:style>
+      </p:cxnSp>
+    </p:spTree>
+    <p:extLst>
+      <p:ext uri="{BB962C8B-B14F-4D97-AF65-F5344CB8AC3E}">
         <p14:creationId xmlns:p14="http://schemas.microsoft.com/office/powerpoint/2010/main" val="2413951672"/>
       </p:ext>
     </p:extLst>
@@ -8030,7 +8115,7 @@
 </p:sld>
 </file>
 
-<file path=ppt/slides/slide15.xml><?xml version="1.0" encoding="utf-8"?>
+<file path=ppt/slides/slide16.xml><?xml version="1.0" encoding="utf-8"?>
 <p:sld xmlns:a="http://schemas.openxmlformats.org/drawingml/2006/main" xmlns:r="http://schemas.openxmlformats.org/officeDocument/2006/relationships" xmlns:p="http://schemas.openxmlformats.org/presentationml/2006/main">
   <p:cSld>
     <p:bg>
@@ -8063,7 +8148,7 @@
                 <a16:creationId xmlns:a16="http://schemas.microsoft.com/office/drawing/2014/main" id="{E3DC42C2-6B58-404C-B339-2C72808A5BE1}"/>
               </a:ext>
               <a:ext uri="{C183D7F6-B498-43B3-948B-1728B52AA6E4}">
-                <adec:decorative xmlns="" xmlns:adec="http://schemas.microsoft.com/office/drawing/2017/decorative" val="1"/>
+                <adec:decorative xmlns:adec="http://schemas.microsoft.com/office/drawing/2017/decorative" xmlns="" val="1"/>
               </a:ext>
             </a:extLst>
           </p:cNvPr>
@@ -8257,7 +8342,7 @@
                 <a16:creationId xmlns:a16="http://schemas.microsoft.com/office/drawing/2014/main" id="{FCF82941-5589-49BF-B6B1-76122B2D0EA6}"/>
               </a:ext>
               <a:ext uri="{C183D7F6-B498-43B3-948B-1728B52AA6E4}">
-                <adec:decorative xmlns="" xmlns:adec="http://schemas.microsoft.com/office/drawing/2017/decorative" val="1"/>
+                <adec:decorative xmlns:adec="http://schemas.microsoft.com/office/drawing/2017/decorative" xmlns="" val="1"/>
               </a:ext>
             </a:extLst>
           </p:cNvPr>
@@ -18433,6 +18518,14 @@
 </file>
 
 <file path=customXml/item2.xml><?xml version="1.0" encoding="utf-8"?>
+<p:properties xmlns:p="http://schemas.microsoft.com/office/2006/metadata/properties" xmlns:xsi="http://www.w3.org/2001/XMLSchema-instance" xmlns:pc="http://schemas.microsoft.com/office/infopath/2007/PartnerControls">
+  <documentManagement>
+    <MediaServiceKeyPoints xmlns="71af3243-3dd4-4a8d-8c0d-dd76da1f02a5" xsi:nil="true"/>
+  </documentManagement>
+</p:properties>
+</file>
+
+<file path=customXml/item3.xml><?xml version="1.0" encoding="utf-8"?>
 <ct:contentTypeSchema xmlns:ct="http://schemas.microsoft.com/office/2006/metadata/contentType" xmlns:ma="http://schemas.microsoft.com/office/2006/metadata/properties/metaAttributes" ct:_="" ma:_="" ma:contentTypeName="Document" ma:contentTypeID="0x01010079F111ED35F8CC479449609E8A0923A6" ma:contentTypeVersion="11" ma:contentTypeDescription="Create a new document." ma:contentTypeScope="" ma:versionID="1c2eb7a32e66fb6e4260f3771546a5e2">
   <xsd:schema xmlns:xsd="http://www.w3.org/2001/XMLSchema" xmlns:xs="http://www.w3.org/2001/XMLSchema" xmlns:p="http://schemas.microsoft.com/office/2006/metadata/properties" xmlns:ns2="71af3243-3dd4-4a8d-8c0d-dd76da1f02a5" xmlns:ns3="16c05727-aa75-4e4a-9b5f-8a80a1165891" targetNamespace="http://schemas.microsoft.com/office/2006/metadata/properties" ma:root="true" ma:fieldsID="04e1f6479c48b08974ba73b5ca973489" ns2:_="" ns3:_="">
     <xsd:import namespace="71af3243-3dd4-4a8d-8c0d-dd76da1f02a5"/>
@@ -18643,14 +18736,6 @@
 </ct:contentTypeSchema>
 </file>
 
-<file path=customXml/item3.xml><?xml version="1.0" encoding="utf-8"?>
-<p:properties xmlns:p="http://schemas.microsoft.com/office/2006/metadata/properties" xmlns:xsi="http://www.w3.org/2001/XMLSchema-instance" xmlns:pc="http://schemas.microsoft.com/office/infopath/2007/PartnerControls">
-  <documentManagement>
-    <MediaServiceKeyPoints xmlns="71af3243-3dd4-4a8d-8c0d-dd76da1f02a5" xsi:nil="true"/>
-  </documentManagement>
-</p:properties>
-</file>
-
 <file path=customXml/itemProps1.xml><?xml version="1.0" encoding="utf-8"?>
 <ds:datastoreItem xmlns:ds="http://schemas.openxmlformats.org/officeDocument/2006/customXml" ds:itemID="{204E1485-0760-4ABF-A612-28A97B86DF09}">
   <ds:schemaRefs>
@@ -18660,6 +18745,23 @@
 </file>
 
 <file path=customXml/itemProps2.xml><?xml version="1.0" encoding="utf-8"?>
+<ds:datastoreItem xmlns:ds="http://schemas.openxmlformats.org/officeDocument/2006/customXml" ds:itemID="{4965EBD3-98B5-4FD2-8FAF-5D4022A9F7F4}">
+  <ds:schemaRefs>
+    <ds:schemaRef ds:uri="http://purl.org/dc/elements/1.1/"/>
+    <ds:schemaRef ds:uri="http://schemas.openxmlformats.org/package/2006/metadata/core-properties"/>
+    <ds:schemaRef ds:uri="http://www.w3.org/XML/1998/namespace"/>
+    <ds:schemaRef ds:uri="16c05727-aa75-4e4a-9b5f-8a80a1165891"/>
+    <ds:schemaRef ds:uri="http://schemas.microsoft.com/office/2006/documentManagement/types"/>
+    <ds:schemaRef ds:uri="http://purl.org/dc/terms/"/>
+    <ds:schemaRef ds:uri="http://schemas.microsoft.com/office/infopath/2007/PartnerControls"/>
+    <ds:schemaRef ds:uri="71af3243-3dd4-4a8d-8c0d-dd76da1f02a5"/>
+    <ds:schemaRef ds:uri="http://schemas.microsoft.com/office/2006/metadata/properties"/>
+    <ds:schemaRef ds:uri="http://purl.org/dc/dcmitype/"/>
+  </ds:schemaRefs>
+</ds:datastoreItem>
+</file>
+
+<file path=customXml/itemProps3.xml><?xml version="1.0" encoding="utf-8"?>
 <ds:datastoreItem xmlns:ds="http://schemas.openxmlformats.org/officeDocument/2006/customXml" ds:itemID="{55813238-AF3D-40EB-A3A4-550AB85131D4}">
   <ds:schemaRefs>
     <ds:schemaRef ds:uri="http://schemas.microsoft.com/office/2006/metadata/contentType"/>
@@ -18676,21 +18778,4 @@
     <ds:schemaRef ds:uri="http://schemas.microsoft.com/internal/obd"/>
   </ds:schemaRefs>
 </ds:datastoreItem>
-</file>
-
-<file path=customXml/itemProps3.xml><?xml version="1.0" encoding="utf-8"?>
-<ds:datastoreItem xmlns:ds="http://schemas.openxmlformats.org/officeDocument/2006/customXml" ds:itemID="{4965EBD3-98B5-4FD2-8FAF-5D4022A9F7F4}">
-  <ds:schemaRefs>
-    <ds:schemaRef ds:uri="http://purl.org/dc/elements/1.1/"/>
-    <ds:schemaRef ds:uri="http://schemas.openxmlformats.org/package/2006/metadata/core-properties"/>
-    <ds:schemaRef ds:uri="http://www.w3.org/XML/1998/namespace"/>
-    <ds:schemaRef ds:uri="16c05727-aa75-4e4a-9b5f-8a80a1165891"/>
-    <ds:schemaRef ds:uri="http://schemas.microsoft.com/office/2006/documentManagement/types"/>
-    <ds:schemaRef ds:uri="http://purl.org/dc/terms/"/>
-    <ds:schemaRef ds:uri="http://schemas.microsoft.com/office/infopath/2007/PartnerControls"/>
-    <ds:schemaRef ds:uri="71af3243-3dd4-4a8d-8c0d-dd76da1f02a5"/>
-    <ds:schemaRef ds:uri="http://schemas.microsoft.com/office/2006/metadata/properties"/>
-    <ds:schemaRef ds:uri="http://purl.org/dc/dcmitype/"/>
-  </ds:schemaRefs>
-</ds:datastoreItem>
 </file>
</xml_diff>